<commit_message>
Seshan Bros logo added to all Intermediate Lessons
</commit_message>
<xml_diff>
--- a/translations/en-us/intermediate/BrickButtons.pptx
+++ b/translations/en-us/intermediate/BrickButtons.pptx
@@ -219,7 +219,7 @@
           <a:p>
             <a:fld id="{DA1035ED-5FA1-BD4D-ABFA-C98F4B1B9192}" type="datetimeFigureOut">
               <a:rPr lang="en-US" smtClean="0"/>
-              <a:t>7/6/2016</a:t>
+              <a:t>7/19/16</a:t>
             </a:fld>
             <a:endParaRPr lang="en-US"/>
           </a:p>
@@ -385,7 +385,7 @@
           <a:p>
             <a:fld id="{EE248F52-A887-2249-BA20-412622C14964}" type="datetimeFigureOut">
               <a:rPr lang="en-US" smtClean="0"/>
-              <a:t>7/6/2016</a:t>
+              <a:t>7/19/16</a:t>
             </a:fld>
             <a:endParaRPr lang="en-US"/>
           </a:p>
@@ -1010,7 +1010,7 @@
           <a:p>
             <a:fld id="{3B8E2234-8EE9-4A06-A7F5-F174EF18FFF3}" type="datetime1">
               <a:rPr lang="en-US" smtClean="0"/>
-              <a:t>7/6/2016</a:t>
+              <a:t>7/19/16</a:t>
             </a:fld>
             <a:endParaRPr lang="en-US"/>
           </a:p>
@@ -1207,7 +1207,7 @@
           <a:noFill/>
           <a:extLst>
             <a:ext uri="{909E8E84-426E-40dd-AFC4-6F175D3DCCD1}">
-              <a14:hiddenFill xmlns:a14="http://schemas.microsoft.com/office/drawing/2010/main" xmlns="">
+              <a14:hiddenFill xmlns="" xmlns:a14="http://schemas.microsoft.com/office/drawing/2010/main">
                 <a:solidFill>
                   <a:srgbClr val="FFFFFF"/>
                 </a:solidFill>
@@ -1338,7 +1338,7 @@
           <a:p>
             <a:fld id="{2CA46A32-913C-4DA2-A3D8-AA068AE0835C}" type="datetime1">
               <a:rPr lang="en-US" smtClean="0"/>
-              <a:t>7/6/2016</a:t>
+              <a:t>7/19/16</a:t>
             </a:fld>
             <a:endParaRPr lang="en-US"/>
           </a:p>
@@ -1597,7 +1597,7 @@
           <a:p>
             <a:fld id="{B38ABFBC-ACD9-48D8-A1CC-82DF1DA8C764}" type="datetime1">
               <a:rPr lang="en-US" smtClean="0"/>
-              <a:t>7/6/2016</a:t>
+              <a:t>7/19/16</a:t>
             </a:fld>
             <a:endParaRPr lang="en-US"/>
           </a:p>
@@ -1851,7 +1851,7 @@
           <a:p>
             <a:fld id="{55C42284-A491-45EA-884C-86E1F8483FC8}" type="datetime1">
               <a:rPr lang="en-US" smtClean="0"/>
-              <a:t>7/6/2016</a:t>
+              <a:t>7/19/16</a:t>
             </a:fld>
             <a:endParaRPr lang="en-US"/>
           </a:p>
@@ -2296,7 +2296,7 @@
           <a:p>
             <a:fld id="{112AE8D3-8E56-4B7F-AE5F-46CBE23B0CFD}" type="datetime1">
               <a:rPr lang="en-US" smtClean="0"/>
-              <a:t>7/6/2016</a:t>
+              <a:t>7/19/16</a:t>
             </a:fld>
             <a:endParaRPr lang="en-US"/>
           </a:p>
@@ -2642,7 +2642,7 @@
           <a:p>
             <a:fld id="{58AE109B-C68A-413E-B164-04EF4E132973}" type="datetime1">
               <a:rPr lang="en-US" smtClean="0"/>
-              <a:t>7/6/2016</a:t>
+              <a:t>7/19/16</a:t>
             </a:fld>
             <a:endParaRPr lang="en-US"/>
           </a:p>
@@ -2920,7 +2920,7 @@
           <a:p>
             <a:fld id="{F4976061-0D1F-4646-92B5-D1189CD4E313}" type="datetime1">
               <a:rPr lang="en-US" smtClean="0"/>
-              <a:t>7/6/2016</a:t>
+              <a:t>7/19/16</a:t>
             </a:fld>
             <a:endParaRPr lang="en-US"/>
           </a:p>
@@ -3303,7 +3303,7 @@
           <a:p>
             <a:fld id="{B0B171A5-125A-48A7-88F7-776E8738829B}" type="datetime1">
               <a:rPr lang="en-US" smtClean="0"/>
-              <a:t>7/6/2016</a:t>
+              <a:t>7/19/16</a:t>
             </a:fld>
             <a:endParaRPr lang="en-US"/>
           </a:p>
@@ -3424,7 +3424,7 @@
           <a:p>
             <a:fld id="{2C82204C-70DE-4498-BAD9-6EE9849ECCB3}" type="datetime1">
               <a:rPr lang="en-US" smtClean="0"/>
-              <a:t>7/6/2016</a:t>
+              <a:t>7/19/16</a:t>
             </a:fld>
             <a:endParaRPr lang="en-US"/>
           </a:p>
@@ -3598,7 +3598,7 @@
           <a:p>
             <a:fld id="{05D15343-59C2-441A-8F75-A32C45CD794C}" type="datetime1">
               <a:rPr lang="en-US" smtClean="0"/>
-              <a:t>7/6/2016</a:t>
+              <a:t>7/19/16</a:t>
             </a:fld>
             <a:endParaRPr lang="en-US"/>
           </a:p>
@@ -3955,7 +3955,7 @@
           <a:p>
             <a:fld id="{A883D8BA-A56D-4E86-A983-E43D4CBC321A}" type="datetime1">
               <a:rPr lang="en-US" smtClean="0"/>
-              <a:t>7/6/2016</a:t>
+              <a:t>7/19/16</a:t>
             </a:fld>
             <a:endParaRPr lang="en-US"/>
           </a:p>
@@ -4149,7 +4149,7 @@
           <a:p>
             <a:fld id="{3C1F9A7F-29D4-4E4A-A505-A54955CD304B}" type="datetime1">
               <a:rPr lang="en-US" smtClean="0"/>
-              <a:t>7/6/2016</a:t>
+              <a:t>7/19/16</a:t>
             </a:fld>
             <a:endParaRPr lang="en-US"/>
           </a:p>
@@ -4513,7 +4513,7 @@
           <a:p>
             <a:fld id="{59162E3F-B884-4197-B05E-D8C7822B58D2}" type="datetime1">
               <a:rPr lang="en-US" smtClean="0"/>
-              <a:t>7/6/2016</a:t>
+              <a:t>7/19/16</a:t>
             </a:fld>
             <a:endParaRPr lang="en-US"/>
           </a:p>
@@ -4686,7 +4686,7 @@
           <a:p>
             <a:fld id="{808A9BD6-CE24-4549-89E6-885479E10C75}" type="datetime1">
               <a:rPr lang="en-US" smtClean="0"/>
-              <a:t>7/6/2016</a:t>
+              <a:t>7/19/16</a:t>
             </a:fld>
             <a:endParaRPr lang="en-US"/>
           </a:p>
@@ -4945,7 +4945,7 @@
           <a:p>
             <a:fld id="{B1B2D27D-97FE-4013-B7A6-0F24274A4F5B}" type="datetime1">
               <a:rPr lang="en-US" smtClean="0"/>
-              <a:t>7/6/2016</a:t>
+              <a:t>7/19/16</a:t>
             </a:fld>
             <a:endParaRPr lang="en-US"/>
           </a:p>
@@ -5291,7 +5291,7 @@
           <a:p>
             <a:fld id="{E920A8A9-2788-4709-B075-6D1D88E46A7B}" type="datetime1">
               <a:rPr lang="en-US" smtClean="0"/>
-              <a:t>7/6/2016</a:t>
+              <a:t>7/19/16</a:t>
             </a:fld>
             <a:endParaRPr lang="en-US"/>
           </a:p>
@@ -5569,7 +5569,7 @@
           <a:p>
             <a:fld id="{C1BCC2E7-E938-4490-9477-51E3DF765143}" type="datetime1">
               <a:rPr lang="en-US" smtClean="0"/>
-              <a:t>7/6/2016</a:t>
+              <a:t>7/19/16</a:t>
             </a:fld>
             <a:endParaRPr lang="en-US"/>
           </a:p>
@@ -5952,7 +5952,7 @@
           <a:p>
             <a:fld id="{239F8526-1BBF-4C59-8699-64CB3D1B244F}" type="datetime1">
               <a:rPr lang="en-US" smtClean="0"/>
-              <a:t>7/6/2016</a:t>
+              <a:t>7/19/16</a:t>
             </a:fld>
             <a:endParaRPr lang="en-US"/>
           </a:p>
@@ -6073,7 +6073,7 @@
           <a:p>
             <a:fld id="{6035D1CA-BF6F-4EF7-A28B-1C9AA5F82A96}" type="datetime1">
               <a:rPr lang="en-US" smtClean="0"/>
-              <a:t>7/6/2016</a:t>
+              <a:t>7/19/16</a:t>
             </a:fld>
             <a:endParaRPr lang="en-US"/>
           </a:p>
@@ -6247,7 +6247,7 @@
           <a:p>
             <a:fld id="{6988D5E6-551E-45C1-9C7B-6DC611F3B08E}" type="datetime1">
               <a:rPr lang="en-US" smtClean="0"/>
-              <a:t>7/6/2016</a:t>
+              <a:t>7/19/16</a:t>
             </a:fld>
             <a:endParaRPr lang="en-US"/>
           </a:p>
@@ -6604,7 +6604,7 @@
           <a:p>
             <a:fld id="{2DAA819A-255F-4E66-BE66-F495098023DA}" type="datetime1">
               <a:rPr lang="en-US" smtClean="0"/>
-              <a:t>7/6/2016</a:t>
+              <a:t>7/19/16</a:t>
             </a:fld>
             <a:endParaRPr lang="en-US"/>
           </a:p>
@@ -6989,7 +6989,7 @@
           <a:p>
             <a:fld id="{39DE76C4-2293-4131-9766-AFEE72B723CA}" type="datetime1">
               <a:rPr lang="en-US" smtClean="0"/>
-              <a:t>7/6/2016</a:t>
+              <a:t>7/19/16</a:t>
             </a:fld>
             <a:endParaRPr lang="en-US"/>
           </a:p>
@@ -7281,7 +7281,7 @@
           <a:p>
             <a:fld id="{F2DDA51C-0EF9-447B-8052-14A74C37BDDC}" type="datetime1">
               <a:rPr lang="en-US" smtClean="0"/>
-              <a:t>7/6/2016</a:t>
+              <a:t>7/19/16</a:t>
             </a:fld>
             <a:endParaRPr lang="en-US" dirty="0"/>
           </a:p>
@@ -8059,7 +8059,7 @@
           <a:p>
             <a:fld id="{4800EE58-8E07-47B4-B5C3-C40EF0E1C583}" type="datetime1">
               <a:rPr lang="en-US" smtClean="0"/>
-              <a:t>7/6/2016</a:t>
+              <a:t>7/19/16</a:t>
             </a:fld>
             <a:endParaRPr lang="en-US" dirty="0"/>
           </a:p>
@@ -8721,6 +8721,35 @@
           </a:p>
         </p:txBody>
       </p:sp>
+      <p:pic>
+        <p:nvPicPr>
+          <p:cNvPr id="5" name="Picture 4"/>
+          <p:cNvPicPr>
+            <a:picLocks noChangeAspect="1"/>
+          </p:cNvPicPr>
+          <p:nvPr/>
+        </p:nvPicPr>
+        <p:blipFill rotWithShape="1">
+          <a:blip r:embed="rId3">
+            <a:extLst>
+              <a:ext uri="{28A0092B-C50C-407E-A947-70E740481C1C}">
+                <a14:useLocalDpi xmlns:a14="http://schemas.microsoft.com/office/drawing/2010/main" val="0"/>
+              </a:ext>
+            </a:extLst>
+          </a:blip>
+          <a:srcRect l="4523" t="17619" r="3095" b="25000"/>
+          <a:stretch/>
+        </p:blipFill>
+        <p:spPr>
+          <a:xfrm>
+            <a:off x="3711108" y="4592409"/>
+            <a:ext cx="1700816" cy="1056435"/>
+          </a:xfrm>
+          <a:prstGeom prst="rect">
+            <a:avLst/>
+          </a:prstGeom>
+        </p:spPr>
+      </p:pic>
     </p:spTree>
     <p:extLst>
       <p:ext uri="{BB962C8B-B14F-4D97-AF65-F5344CB8AC3E}">
@@ -9689,7 +9718,7 @@
           <a:effectLst/>
           <a:extLst>
             <a:ext uri="{91240B29-F687-4f45-9708-019B960494DF}">
-              <a14:hiddenLine xmlns:a14="http://schemas.microsoft.com/office/drawing/2010/main" xmlns="" w="9525">
+              <a14:hiddenLine xmlns="" xmlns:a14="http://schemas.microsoft.com/office/drawing/2010/main" w="9525">
                 <a:solidFill>
                   <a:schemeClr val="tx1"/>
                 </a:solidFill>
@@ -9699,7 +9728,7 @@
               </a14:hiddenLine>
             </a:ext>
             <a:ext uri="{AF507438-7753-43e0-B8FC-AC1667EBCBE1}">
-              <a14:hiddenEffects xmlns:a14="http://schemas.microsoft.com/office/drawing/2010/main" xmlns="">
+              <a14:hiddenEffects xmlns="" xmlns:a14="http://schemas.microsoft.com/office/drawing/2010/main">
                 <a:effectLst>
                   <a:outerShdw dist="35921" dir="2700000" algn="ctr" rotWithShape="0">
                     <a:schemeClr val="bg2"/>
@@ -9874,6 +9903,18 @@
               </a:rPr>
               <a:t>                         </a:t>
             </a:r>
+            <a:r>
+              <a:rPr kumimoji="0" lang="en-US" altLang="en-US" sz="1600" b="0" i="0" u="none" strike="noStrike" cap="none" normalizeH="0" baseline="0" dirty="0">
+                <a:ln>
+                  <a:noFill/>
+                </a:ln>
+                <a:solidFill>
+                  <a:schemeClr val="tx1"/>
+                </a:solidFill>
+                <a:effectLst/>
+              </a:rPr>
+              <a:t/>
+            </a:r>
             <a:br>
               <a:rPr kumimoji="0" lang="en-US" altLang="en-US" sz="1600" b="0" i="0" u="none" strike="noStrike" cap="none" normalizeH="0" baseline="0" dirty="0">
                 <a:ln>
@@ -10040,7 +10081,7 @@
           <a:noFill/>
           <a:extLst>
             <a:ext uri="{909E8E84-426E-40dd-AFC4-6F175D3DCCD1}">
-              <a14:hiddenFill xmlns:a14="http://schemas.microsoft.com/office/drawing/2010/main" xmlns="">
+              <a14:hiddenFill xmlns="" xmlns:a14="http://schemas.microsoft.com/office/drawing/2010/main">
                 <a:solidFill>
                   <a:srgbClr val="FFFFFF"/>
                 </a:solidFill>

</xml_diff>